<commit_message>
Created a new title
</commit_message>
<xml_diff>
--- a/WorkingOnIcon.pptx
+++ b/WorkingOnIcon.pptx
@@ -6,6 +6,7 @@
   </p:sldMasterIdLst>
   <p:sldIdLst>
     <p:sldId id="256" r:id="rId2"/>
+    <p:sldId id="257" r:id="rId3"/>
   </p:sldIdLst>
   <p:sldSz cx="12192000" cy="6858000"/>
   <p:notesSz cx="6858000" cy="9144000"/>
@@ -104,6 +105,11 @@
       </a:defRPr>
     </a:lvl9pPr>
   </p:defaultTextStyle>
+  <p:extLst>
+    <p:ext uri="{EFAFB233-063F-42B5-8137-9DF3F51BA10A}">
+      <p15:sldGuideLst xmlns:p15="http://schemas.microsoft.com/office/powerpoint/2012/main"/>
+    </p:ext>
+  </p:extLst>
 </p:presentation>
 </file>
 
@@ -4033,6 +4039,351 @@
 </p:sld>
 </file>
 
+<file path=ppt/slides/slide2.xml><?xml version="1.0" encoding="utf-8"?>
+<p:sld xmlns:a="http://schemas.openxmlformats.org/drawingml/2006/main" xmlns:r="http://schemas.openxmlformats.org/officeDocument/2006/relationships" xmlns:p="http://schemas.openxmlformats.org/presentationml/2006/main">
+  <p:cSld>
+    <p:spTree>
+      <p:nvGrpSpPr>
+        <p:cNvPr id="1" name=""/>
+        <p:cNvGrpSpPr/>
+        <p:nvPr/>
+      </p:nvGrpSpPr>
+      <p:grpSpPr>
+        <a:xfrm>
+          <a:off x="0" y="0"/>
+          <a:ext cx="0" cy="0"/>
+          <a:chOff x="0" y="0"/>
+          <a:chExt cx="0" cy="0"/>
+        </a:xfrm>
+      </p:grpSpPr>
+      <p:pic>
+        <p:nvPicPr>
+          <p:cNvPr id="5" name="Graphic 4" descr="Upward trend">
+            <a:extLst>
+              <a:ext uri="{FF2B5EF4-FFF2-40B4-BE49-F238E27FC236}">
+                <a16:creationId xmlns:a16="http://schemas.microsoft.com/office/drawing/2014/main" id="{93D489AF-9BE8-49C1-ADF6-54829BC8FD65}"/>
+              </a:ext>
+            </a:extLst>
+          </p:cNvPr>
+          <p:cNvPicPr>
+            <a:picLocks noChangeAspect="1"/>
+          </p:cNvPicPr>
+          <p:nvPr/>
+        </p:nvPicPr>
+        <p:blipFill>
+          <a:blip r:embed="rId2">
+            <a:extLst>
+              <a:ext uri="{28A0092B-C50C-407E-A947-70E740481C1C}">
+                <a14:useLocalDpi xmlns:a14="http://schemas.microsoft.com/office/drawing/2010/main" val="0"/>
+              </a:ext>
+              <a:ext uri="{96DAC541-7B7A-43D3-8B79-37D633B846F1}">
+                <asvg:svgBlip xmlns:asvg="http://schemas.microsoft.com/office/drawing/2016/SVG/main" r:embed="rId3"/>
+              </a:ext>
+            </a:extLst>
+          </a:blip>
+          <a:stretch>
+            <a:fillRect/>
+          </a:stretch>
+        </p:blipFill>
+        <p:spPr>
+          <a:xfrm>
+            <a:off x="5969017" y="3030134"/>
+            <a:ext cx="914400" cy="914400"/>
+          </a:xfrm>
+          <a:prstGeom prst="rect">
+            <a:avLst/>
+          </a:prstGeom>
+        </p:spPr>
+      </p:pic>
+      <mc:AlternateContent xmlns:mc="http://schemas.openxmlformats.org/markup-compatibility/2006">
+        <mc:Choice xmlns:a14="http://schemas.microsoft.com/office/drawing/2010/main" Requires="a14">
+          <p:sp>
+            <p:nvSpPr>
+              <p:cNvPr id="8" name="TextBox 7">
+                <a:extLst>
+                  <a:ext uri="{FF2B5EF4-FFF2-40B4-BE49-F238E27FC236}">
+                    <a16:creationId xmlns:a16="http://schemas.microsoft.com/office/drawing/2014/main" id="{F4EA8AF8-C06E-4AA0-A1C6-F4E927142FB0}"/>
+                  </a:ext>
+                </a:extLst>
+              </p:cNvPr>
+              <p:cNvSpPr txBox="1"/>
+              <p:nvPr/>
+            </p:nvSpPr>
+            <p:spPr>
+              <a:xfrm>
+                <a:off x="4604691" y="2875002"/>
+                <a:ext cx="774827" cy="1107996"/>
+              </a:xfrm>
+              <a:prstGeom prst="rect">
+                <a:avLst/>
+              </a:prstGeom>
+              <a:noFill/>
+            </p:spPr>
+            <p:txBody>
+              <a:bodyPr wrap="none" lIns="0" tIns="0" rIns="0" bIns="0" rtlCol="0">
+                <a:spAutoFit/>
+              </a:bodyPr>
+              <a:lstStyle/>
+              <a:p>
+                <a14:m>
+                  <m:oMathPara xmlns:m="http://schemas.openxmlformats.org/officeDocument/2006/math">
+                    <m:oMathParaPr>
+                      <m:jc m:val="centerGroup"/>
+                    </m:oMathParaPr>
+                    <m:oMath xmlns:m="http://schemas.openxmlformats.org/officeDocument/2006/math">
+                      <m:r>
+                        <a:rPr lang="en-US" sz="7200" b="0" i="1" smtClean="0">
+                          <a:latin typeface="Cambria Math" panose="02040503050406030204" pitchFamily="18" charset="0"/>
+                          <a:ea typeface="Cambria Math" panose="02040503050406030204" pitchFamily="18" charset="0"/>
+                        </a:rPr>
+                        <m:t>𝜋</m:t>
+                      </m:r>
+                    </m:oMath>
+                  </m:oMathPara>
+                </a14:m>
+                <a:endParaRPr lang="en-SE" sz="4000" dirty="0"/>
+              </a:p>
+            </p:txBody>
+          </p:sp>
+        </mc:Choice>
+        <mc:Fallback>
+          <p:sp>
+            <p:nvSpPr>
+              <p:cNvPr id="8" name="TextBox 7">
+                <a:extLst>
+                  <a:ext uri="{FF2B5EF4-FFF2-40B4-BE49-F238E27FC236}">
+                    <a16:creationId xmlns:a16="http://schemas.microsoft.com/office/drawing/2014/main" id="{F4EA8AF8-C06E-4AA0-A1C6-F4E927142FB0}"/>
+                  </a:ext>
+                </a:extLst>
+              </p:cNvPr>
+              <p:cNvSpPr txBox="1">
+                <a:spLocks noRot="1" noChangeAspect="1" noMove="1" noResize="1" noEditPoints="1" noAdjustHandles="1" noChangeArrowheads="1" noChangeShapeType="1" noTextEdit="1"/>
+              </p:cNvSpPr>
+              <p:nvPr/>
+            </p:nvSpPr>
+            <p:spPr>
+              <a:xfrm>
+                <a:off x="4604691" y="2875002"/>
+                <a:ext cx="774827" cy="1107996"/>
+              </a:xfrm>
+              <a:prstGeom prst="rect">
+                <a:avLst/>
+              </a:prstGeom>
+              <a:blipFill>
+                <a:blip r:embed="rId4"/>
+                <a:stretch>
+                  <a:fillRect/>
+                </a:stretch>
+              </a:blipFill>
+            </p:spPr>
+            <p:txBody>
+              <a:bodyPr/>
+              <a:lstStyle/>
+              <a:p>
+                <a:r>
+                  <a:rPr lang="en-SE">
+                    <a:noFill/>
+                  </a:rPr>
+                  <a:t> </a:t>
+                </a:r>
+              </a:p>
+            </p:txBody>
+          </p:sp>
+        </mc:Fallback>
+      </mc:AlternateContent>
+      <mc:AlternateContent xmlns:mc="http://schemas.openxmlformats.org/markup-compatibility/2006">
+        <mc:Choice xmlns:a14="http://schemas.microsoft.com/office/drawing/2010/main" Requires="a14">
+          <p:sp>
+            <p:nvSpPr>
+              <p:cNvPr id="9" name="TextBox 8">
+                <a:extLst>
+                  <a:ext uri="{FF2B5EF4-FFF2-40B4-BE49-F238E27FC236}">
+                    <a16:creationId xmlns:a16="http://schemas.microsoft.com/office/drawing/2014/main" id="{254335F4-50F6-4E46-981D-48227DD2DDC7}"/>
+                  </a:ext>
+                </a:extLst>
+              </p:cNvPr>
+              <p:cNvSpPr txBox="1"/>
+              <p:nvPr/>
+            </p:nvSpPr>
+            <p:spPr>
+              <a:xfrm>
+                <a:off x="4862102" y="3218855"/>
+                <a:ext cx="4260328" cy="553998"/>
+              </a:xfrm>
+              <a:prstGeom prst="rect">
+                <a:avLst/>
+              </a:prstGeom>
+              <a:noFill/>
+            </p:spPr>
+            <p:txBody>
+              <a:bodyPr wrap="square" lIns="0" tIns="0" rIns="0" bIns="0" rtlCol="0">
+                <a:spAutoFit/>
+              </a:bodyPr>
+              <a:lstStyle/>
+              <a:p>
+                <a14:m>
+                  <m:oMathPara xmlns:m="http://schemas.openxmlformats.org/officeDocument/2006/math">
+                    <m:oMathParaPr>
+                      <m:jc m:val="centerGroup"/>
+                    </m:oMathParaPr>
+                    <m:oMath xmlns:m="http://schemas.openxmlformats.org/officeDocument/2006/math">
+                      <m:r>
+                        <a:rPr lang="en-US" sz="3600" b="0" i="1" smtClean="0">
+                          <a:latin typeface="Cambria Math" panose="02040503050406030204" pitchFamily="18" charset="0"/>
+                        </a:rPr>
+                        <m:t>+            +        =</m:t>
+                      </m:r>
+                    </m:oMath>
+                  </m:oMathPara>
+                </a14:m>
+                <a:endParaRPr lang="en-SE" sz="2800" dirty="0"/>
+              </a:p>
+            </p:txBody>
+          </p:sp>
+        </mc:Choice>
+        <mc:Fallback>
+          <p:sp>
+            <p:nvSpPr>
+              <p:cNvPr id="9" name="TextBox 8">
+                <a:extLst>
+                  <a:ext uri="{FF2B5EF4-FFF2-40B4-BE49-F238E27FC236}">
+                    <a16:creationId xmlns:a16="http://schemas.microsoft.com/office/drawing/2014/main" id="{254335F4-50F6-4E46-981D-48227DD2DDC7}"/>
+                  </a:ext>
+                </a:extLst>
+              </p:cNvPr>
+              <p:cNvSpPr txBox="1">
+                <a:spLocks noRot="1" noChangeAspect="1" noMove="1" noResize="1" noEditPoints="1" noAdjustHandles="1" noChangeArrowheads="1" noChangeShapeType="1" noTextEdit="1"/>
+              </p:cNvSpPr>
+              <p:nvPr/>
+            </p:nvSpPr>
+            <p:spPr>
+              <a:xfrm>
+                <a:off x="4862102" y="3218855"/>
+                <a:ext cx="4260328" cy="553998"/>
+              </a:xfrm>
+              <a:prstGeom prst="rect">
+                <a:avLst/>
+              </a:prstGeom>
+              <a:blipFill>
+                <a:blip r:embed="rId5"/>
+                <a:stretch>
+                  <a:fillRect/>
+                </a:stretch>
+              </a:blipFill>
+            </p:spPr>
+            <p:txBody>
+              <a:bodyPr/>
+              <a:lstStyle/>
+              <a:p>
+                <a:r>
+                  <a:rPr lang="en-SE">
+                    <a:noFill/>
+                  </a:rPr>
+                  <a:t> </a:t>
+                </a:r>
+              </a:p>
+            </p:txBody>
+          </p:sp>
+        </mc:Fallback>
+      </mc:AlternateContent>
+      <p:sp>
+        <p:nvSpPr>
+          <p:cNvPr id="10" name="TextBox 9">
+            <a:extLst>
+              <a:ext uri="{FF2B5EF4-FFF2-40B4-BE49-F238E27FC236}">
+                <a16:creationId xmlns:a16="http://schemas.microsoft.com/office/drawing/2014/main" id="{F461440F-0E77-4616-A772-FD1CEE664A18}"/>
+              </a:ext>
+            </a:extLst>
+          </p:cNvPr>
+          <p:cNvSpPr txBox="1"/>
+          <p:nvPr/>
+        </p:nvSpPr>
+        <p:spPr>
+          <a:xfrm>
+            <a:off x="7416924" y="3194947"/>
+            <a:ext cx="595035" cy="584775"/>
+          </a:xfrm>
+          <a:prstGeom prst="rect">
+            <a:avLst/>
+          </a:prstGeom>
+          <a:noFill/>
+        </p:spPr>
+        <p:txBody>
+          <a:bodyPr wrap="none" rtlCol="0">
+            <a:spAutoFit/>
+          </a:bodyPr>
+          <a:lstStyle/>
+          <a:p>
+            <a:r>
+              <a:rPr lang="en-US" sz="3200" dirty="0">
+                <a:latin typeface="Arial Black" panose="020B0A04020102020204" pitchFamily="34" charset="0"/>
+              </a:rPr>
+              <a:t>io</a:t>
+            </a:r>
+            <a:endParaRPr lang="en-SE" sz="3200" dirty="0">
+              <a:latin typeface="Arial Black" panose="020B0A04020102020204" pitchFamily="34" charset="0"/>
+            </a:endParaRPr>
+          </a:p>
+        </p:txBody>
+      </p:sp>
+      <p:pic>
+        <p:nvPicPr>
+          <p:cNvPr id="12" name="Picture 11" descr="A close up of a logo&#10;&#10;Description automatically generated">
+            <a:extLst>
+              <a:ext uri="{FF2B5EF4-FFF2-40B4-BE49-F238E27FC236}">
+                <a16:creationId xmlns:a16="http://schemas.microsoft.com/office/drawing/2014/main" id="{886A8079-3823-41B9-A5F6-24F1EB0E4C6E}"/>
+              </a:ext>
+            </a:extLst>
+          </p:cNvPr>
+          <p:cNvPicPr>
+            <a:picLocks noChangeAspect="1"/>
+          </p:cNvPicPr>
+          <p:nvPr/>
+        </p:nvPicPr>
+        <p:blipFill>
+          <a:blip r:embed="rId6">
+            <a:extLst>
+              <a:ext uri="{BEBA8EAE-BF5A-486C-A8C5-ECC9F3942E4B}">
+                <a14:imgProps xmlns:a14="http://schemas.microsoft.com/office/drawing/2010/main">
+                  <a14:imgLayer r:embed="rId7">
+                    <a14:imgEffect>
+                      <a14:saturation sat="0"/>
+                    </a14:imgEffect>
+                  </a14:imgLayer>
+                </a14:imgProps>
+              </a:ext>
+              <a:ext uri="{28A0092B-C50C-407E-A947-70E740481C1C}">
+                <a14:useLocalDpi xmlns:a14="http://schemas.microsoft.com/office/drawing/2010/main" val="0"/>
+              </a:ext>
+            </a:extLst>
+          </a:blip>
+          <a:stretch>
+            <a:fillRect/>
+          </a:stretch>
+        </p:blipFill>
+        <p:spPr>
+          <a:xfrm>
+            <a:off x="8674382" y="3121438"/>
+            <a:ext cx="1171497" cy="748832"/>
+          </a:xfrm>
+          <a:prstGeom prst="rect">
+            <a:avLst/>
+          </a:prstGeom>
+        </p:spPr>
+      </p:pic>
+    </p:spTree>
+    <p:extLst>
+      <p:ext uri="{BB962C8B-B14F-4D97-AF65-F5344CB8AC3E}">
+        <p14:creationId xmlns:p14="http://schemas.microsoft.com/office/powerpoint/2010/main" val="2819625575"/>
+      </p:ext>
+    </p:extLst>
+  </p:cSld>
+  <p:clrMapOvr>
+    <a:masterClrMapping/>
+  </p:clrMapOvr>
+</p:sld>
+</file>
+
 <file path=ppt/theme/theme1.xml><?xml version="1.0" encoding="utf-8"?>
 <a:theme xmlns:a="http://schemas.openxmlformats.org/drawingml/2006/main" name="Office Theme">
   <a:themeElements>

</xml_diff>